<commit_message>
Added assignment number on the first slide
</commit_message>
<xml_diff>
--- a/module-11/Security Controls in Shared Source Code Repositories.pptx
+++ b/module-11/Security Controls in Shared Source Code Repositories.pptx
@@ -29042,11 +29042,13 @@
         <p:spPr>
           <a:xfrm>
             <a:off x="1658640" y="4279434"/>
-            <a:ext cx="5826719" cy="1096899"/>
+            <a:ext cx="5826719" cy="1435566"/>
           </a:xfrm>
         </p:spPr>
         <p:txBody>
-          <a:bodyPr/>
+          <a:bodyPr>
+            <a:normAutofit lnSpcReduction="10000"/>
+          </a:bodyPr>
           <a:lstStyle/>
           <a:p>
             <a:pPr algn="ctr"/>
@@ -29054,7 +29056,28 @@
               <a:rPr lang="en-US" dirty="0"/>
               <a:t>By Hugo Ramirez Jr</a:t>
             </a:r>
-            <a:endParaRPr dirty="0"/>
+          </a:p>
+          <a:p>
+            <a:pPr algn="ctr"/>
+            <a:endParaRPr lang="en-US" dirty="0"/>
+          </a:p>
+          <a:p>
+            <a:pPr algn="ctr"/>
+            <a:r>
+              <a:rPr lang="en-US" sz="1000" dirty="0"/>
+              <a:t>Module 11.2</a:t>
+            </a:r>
+          </a:p>
+          <a:p>
+            <a:pPr algn="ctr"/>
+            <a:r>
+              <a:rPr lang="en-US" sz="1000" dirty="0"/>
+              <a:t>Assignment: Security Controls in Shared Source Code Repositories</a:t>
+            </a:r>
+            <a:br>
+              <a:rPr lang="en-US" sz="1200" dirty="0"/>
+            </a:br>
+            <a:endParaRPr sz="1200" dirty="0"/>
           </a:p>
         </p:txBody>
       </p:sp>

</xml_diff>